<commit_message>
SO for SOLID, also renamed "OOP LIN.pptx" to match existing file standard
</commit_message>
<xml_diff>
--- a/docs/Binaries/SO (Object-oriented design).pptx
+++ b/docs/Binaries/SO (Object-oriented design).pptx
@@ -8,9 +8,6 @@
     <p:sldId id="257" r:id="rId2"/>
     <p:sldId id="258" r:id="rId3"/>
     <p:sldId id="259" r:id="rId4"/>
-    <p:sldId id="260" r:id="rId5"/>
-    <p:sldId id="261" r:id="rId6"/>
-    <p:sldId id="262" r:id="rId7"/>
   </p:sldIdLst>
   <p:sldSz cx="12192000" cy="6858000"/>
   <p:notesSz cx="6858000" cy="9144000"/>
@@ -3043,13 +3040,13 @@
           <a:p>
             <a:r>
               <a:rPr lang="en-GB" b="1" dirty="0">
-                <a:hlinkClick r:id="rId4" action="ppaction://hlinksldjump"/>
+                <a:hlinkClick r:id="" action="ppaction://noaction"/>
               </a:rPr>
               <a:t>L</a:t>
             </a:r>
             <a:r>
               <a:rPr lang="en-GB" dirty="0">
-                <a:hlinkClick r:id="rId4" action="ppaction://hlinksldjump"/>
+                <a:hlinkClick r:id="" action="ppaction://noaction"/>
               </a:rPr>
               <a:t>iskov substitution principle</a:t>
             </a:r>
@@ -3058,13 +3055,13 @@
           <a:p>
             <a:r>
               <a:rPr lang="en-GB" b="1" dirty="0">
-                <a:hlinkClick r:id="rId5" action="ppaction://hlinksldjump"/>
+                <a:hlinkClick r:id="" action="ppaction://noaction"/>
               </a:rPr>
               <a:t>I</a:t>
             </a:r>
             <a:r>
               <a:rPr lang="en-GB" dirty="0">
-                <a:hlinkClick r:id="rId5" action="ppaction://hlinksldjump"/>
+                <a:hlinkClick r:id="" action="ppaction://noaction"/>
               </a:rPr>
               <a:t>nterface segregation principle</a:t>
             </a:r>
@@ -3073,13 +3070,13 @@
           <a:p>
             <a:r>
               <a:rPr lang="en-GB" b="1" dirty="0">
-                <a:hlinkClick r:id="rId6" action="ppaction://hlinksldjump"/>
+                <a:hlinkClick r:id="" action="ppaction://noaction"/>
               </a:rPr>
               <a:t>D</a:t>
             </a:r>
             <a:r>
               <a:rPr lang="en-GB" dirty="0">
-                <a:hlinkClick r:id="rId6" action="ppaction://hlinksldjump"/>
+                <a:hlinkClick r:id="" action="ppaction://noaction"/>
               </a:rPr>
               <a:t>ependency inversion principle</a:t>
             </a:r>
@@ -3167,6 +3164,65 @@
           </a:p>
         </p:txBody>
       </p:sp>
+      <p:pic>
+        <p:nvPicPr>
+          <p:cNvPr id="5" name="Picture 4"/>
+          <p:cNvPicPr>
+            <a:picLocks noChangeAspect="1"/>
+          </p:cNvPicPr>
+          <p:nvPr/>
+        </p:nvPicPr>
+        <p:blipFill>
+          <a:blip r:embed="rId2">
+            <a:extLst>
+              <a:ext uri="{28A0092B-C50C-407E-A947-70E740481C1C}">
+                <a14:useLocalDpi xmlns:a14="http://schemas.microsoft.com/office/drawing/2010/main" val="0"/>
+              </a:ext>
+            </a:extLst>
+          </a:blip>
+          <a:stretch>
+            <a:fillRect/>
+          </a:stretch>
+        </p:blipFill>
+        <p:spPr>
+          <a:xfrm>
+            <a:off x="6781800" y="3393260"/>
+            <a:ext cx="4572000" cy="2314575"/>
+          </a:xfrm>
+          <a:prstGeom prst="rect">
+            <a:avLst/>
+          </a:prstGeom>
+        </p:spPr>
+      </p:pic>
+      <p:sp>
+        <p:nvSpPr>
+          <p:cNvPr id="6" name="TextBox 5"/>
+          <p:cNvSpPr txBox="1"/>
+          <p:nvPr/>
+        </p:nvSpPr>
+        <p:spPr>
+          <a:xfrm>
+            <a:off x="6781800" y="5680789"/>
+            <a:ext cx="4301656" cy="261610"/>
+          </a:xfrm>
+          <a:prstGeom prst="rect">
+            <a:avLst/>
+          </a:prstGeom>
+          <a:noFill/>
+        </p:spPr>
+        <p:txBody>
+          <a:bodyPr wrap="square" rtlCol="0">
+            <a:spAutoFit/>
+          </a:bodyPr>
+          <a:lstStyle/>
+          <a:p>
+            <a:r>
+              <a:rPr lang="en-GB" sz="1100" dirty="0"/>
+              <a:t>http://www.oodesign.com/single-responsibility-principle.html</a:t>
+            </a:r>
+          </a:p>
+        </p:txBody>
+      </p:sp>
     </p:spTree>
     <p:extLst>
       <p:ext uri="{BB962C8B-B14F-4D97-AF65-F5344CB8AC3E}">
@@ -3234,7 +3290,81 @@
           <a:bodyPr/>
           <a:lstStyle/>
           <a:p>
-            <a:endParaRPr lang="en-GB"/>
+            <a:r>
+              <a:rPr lang="en-GB" dirty="0"/>
+              <a:t>Objects and entities in software should be open for extension, but closed for modification from external entities.</a:t>
+            </a:r>
+          </a:p>
+          <a:p>
+            <a:r>
+              <a:rPr lang="en-GB" dirty="0"/>
+              <a:t>Extension of an entity should be easily extendable, with no changes of the base class being required.</a:t>
+            </a:r>
+          </a:p>
+          <a:p>
+            <a:r>
+              <a:rPr lang="en-GB" dirty="0"/>
+              <a:t>i.e. no special casing required</a:t>
+            </a:r>
+          </a:p>
+        </p:txBody>
+      </p:sp>
+      <p:pic>
+        <p:nvPicPr>
+          <p:cNvPr id="4" name="Picture 3"/>
+          <p:cNvPicPr>
+            <a:picLocks noChangeAspect="1"/>
+          </p:cNvPicPr>
+          <p:nvPr/>
+        </p:nvPicPr>
+        <p:blipFill>
+          <a:blip r:embed="rId2">
+            <a:extLst>
+              <a:ext uri="{28A0092B-C50C-407E-A947-70E740481C1C}">
+                <a14:useLocalDpi xmlns:a14="http://schemas.microsoft.com/office/drawing/2010/main" val="0"/>
+              </a:ext>
+            </a:extLst>
+          </a:blip>
+          <a:stretch>
+            <a:fillRect/>
+          </a:stretch>
+        </p:blipFill>
+        <p:spPr>
+          <a:xfrm>
+            <a:off x="6694997" y="3257411"/>
+            <a:ext cx="2752973" cy="3054489"/>
+          </a:xfrm>
+          <a:prstGeom prst="rect">
+            <a:avLst/>
+          </a:prstGeom>
+        </p:spPr>
+      </p:pic>
+      <p:sp>
+        <p:nvSpPr>
+          <p:cNvPr id="5" name="TextBox 4"/>
+          <p:cNvSpPr txBox="1"/>
+          <p:nvPr/>
+        </p:nvSpPr>
+        <p:spPr>
+          <a:xfrm>
+            <a:off x="6694997" y="6311900"/>
+            <a:ext cx="2752973" cy="430887"/>
+          </a:xfrm>
+          <a:prstGeom prst="rect">
+            <a:avLst/>
+          </a:prstGeom>
+          <a:noFill/>
+        </p:spPr>
+        <p:txBody>
+          <a:bodyPr wrap="square" rtlCol="0">
+            <a:spAutoFit/>
+          </a:bodyPr>
+          <a:lstStyle/>
+          <a:p>
+            <a:r>
+              <a:rPr lang="en-GB" sz="1100" dirty="0"/>
+              <a:t>https://scotch.io/bar-talk/s-o-l-i-d-the-first-five-principles-of-object-oriented-design</a:t>
+            </a:r>
           </a:p>
         </p:txBody>
       </p:sp>
@@ -3242,219 +3372,6 @@
     <p:extLst>
       <p:ext uri="{BB962C8B-B14F-4D97-AF65-F5344CB8AC3E}">
         <p14:creationId xmlns:p14="http://schemas.microsoft.com/office/powerpoint/2010/main" val="1552426323"/>
-      </p:ext>
-    </p:extLst>
-  </p:cSld>
-  <p:clrMapOvr>
-    <a:masterClrMapping/>
-  </p:clrMapOvr>
-</p:sld>
-</file>
-
-<file path=ppt/slides/slide4.xml><?xml version="1.0" encoding="utf-8"?>
-<p:sld xmlns:a="http://schemas.openxmlformats.org/drawingml/2006/main" xmlns:r="http://schemas.openxmlformats.org/officeDocument/2006/relationships" xmlns:p="http://schemas.openxmlformats.org/presentationml/2006/main">
-  <p:cSld>
-    <p:spTree>
-      <p:nvGrpSpPr>
-        <p:cNvPr id="1" name=""/>
-        <p:cNvGrpSpPr/>
-        <p:nvPr/>
-      </p:nvGrpSpPr>
-      <p:grpSpPr>
-        <a:xfrm>
-          <a:off x="0" y="0"/>
-          <a:ext cx="0" cy="0"/>
-          <a:chOff x="0" y="0"/>
-          <a:chExt cx="0" cy="0"/>
-        </a:xfrm>
-      </p:grpSpPr>
-      <p:sp>
-        <p:nvSpPr>
-          <p:cNvPr id="2" name="Title 1"/>
-          <p:cNvSpPr>
-            <a:spLocks noGrp="1"/>
-          </p:cNvSpPr>
-          <p:nvPr>
-            <p:ph type="title"/>
-          </p:nvPr>
-        </p:nvSpPr>
-        <p:spPr/>
-        <p:txBody>
-          <a:bodyPr/>
-          <a:lstStyle/>
-          <a:p>
-            <a:r>
-              <a:rPr lang="en-GB" dirty="0"/>
-              <a:t>Liskov substitution principle</a:t>
-            </a:r>
-          </a:p>
-        </p:txBody>
-      </p:sp>
-      <p:sp>
-        <p:nvSpPr>
-          <p:cNvPr id="3" name="Content Placeholder 2"/>
-          <p:cNvSpPr>
-            <a:spLocks noGrp="1"/>
-          </p:cNvSpPr>
-          <p:nvPr>
-            <p:ph idx="1"/>
-          </p:nvPr>
-        </p:nvSpPr>
-        <p:spPr/>
-        <p:txBody>
-          <a:bodyPr/>
-          <a:lstStyle/>
-          <a:p>
-            <a:endParaRPr lang="en-GB"/>
-          </a:p>
-        </p:txBody>
-      </p:sp>
-    </p:spTree>
-    <p:extLst>
-      <p:ext uri="{BB962C8B-B14F-4D97-AF65-F5344CB8AC3E}">
-        <p14:creationId xmlns:p14="http://schemas.microsoft.com/office/powerpoint/2010/main" val="4083087958"/>
-      </p:ext>
-    </p:extLst>
-  </p:cSld>
-  <p:clrMapOvr>
-    <a:masterClrMapping/>
-  </p:clrMapOvr>
-</p:sld>
-</file>
-
-<file path=ppt/slides/slide5.xml><?xml version="1.0" encoding="utf-8"?>
-<p:sld xmlns:a="http://schemas.openxmlformats.org/drawingml/2006/main" xmlns:r="http://schemas.openxmlformats.org/officeDocument/2006/relationships" xmlns:p="http://schemas.openxmlformats.org/presentationml/2006/main">
-  <p:cSld>
-    <p:spTree>
-      <p:nvGrpSpPr>
-        <p:cNvPr id="1" name=""/>
-        <p:cNvGrpSpPr/>
-        <p:nvPr/>
-      </p:nvGrpSpPr>
-      <p:grpSpPr>
-        <a:xfrm>
-          <a:off x="0" y="0"/>
-          <a:ext cx="0" cy="0"/>
-          <a:chOff x="0" y="0"/>
-          <a:chExt cx="0" cy="0"/>
-        </a:xfrm>
-      </p:grpSpPr>
-      <p:sp>
-        <p:nvSpPr>
-          <p:cNvPr id="2" name="Title 1"/>
-          <p:cNvSpPr>
-            <a:spLocks noGrp="1"/>
-          </p:cNvSpPr>
-          <p:nvPr>
-            <p:ph type="title"/>
-          </p:nvPr>
-        </p:nvSpPr>
-        <p:spPr/>
-        <p:txBody>
-          <a:bodyPr/>
-          <a:lstStyle/>
-          <a:p>
-            <a:r>
-              <a:rPr lang="en-GB" dirty="0"/>
-              <a:t>Interface segregation principle</a:t>
-            </a:r>
-          </a:p>
-        </p:txBody>
-      </p:sp>
-      <p:sp>
-        <p:nvSpPr>
-          <p:cNvPr id="3" name="Content Placeholder 2"/>
-          <p:cNvSpPr>
-            <a:spLocks noGrp="1"/>
-          </p:cNvSpPr>
-          <p:nvPr>
-            <p:ph idx="1"/>
-          </p:nvPr>
-        </p:nvSpPr>
-        <p:spPr/>
-        <p:txBody>
-          <a:bodyPr/>
-          <a:lstStyle/>
-          <a:p>
-            <a:endParaRPr lang="en-GB" dirty="0"/>
-          </a:p>
-        </p:txBody>
-      </p:sp>
-    </p:spTree>
-    <p:extLst>
-      <p:ext uri="{BB962C8B-B14F-4D97-AF65-F5344CB8AC3E}">
-        <p14:creationId xmlns:p14="http://schemas.microsoft.com/office/powerpoint/2010/main" val="3716102806"/>
-      </p:ext>
-    </p:extLst>
-  </p:cSld>
-  <p:clrMapOvr>
-    <a:masterClrMapping/>
-  </p:clrMapOvr>
-</p:sld>
-</file>
-
-<file path=ppt/slides/slide6.xml><?xml version="1.0" encoding="utf-8"?>
-<p:sld xmlns:a="http://schemas.openxmlformats.org/drawingml/2006/main" xmlns:r="http://schemas.openxmlformats.org/officeDocument/2006/relationships" xmlns:p="http://schemas.openxmlformats.org/presentationml/2006/main">
-  <p:cSld>
-    <p:spTree>
-      <p:nvGrpSpPr>
-        <p:cNvPr id="1" name=""/>
-        <p:cNvGrpSpPr/>
-        <p:nvPr/>
-      </p:nvGrpSpPr>
-      <p:grpSpPr>
-        <a:xfrm>
-          <a:off x="0" y="0"/>
-          <a:ext cx="0" cy="0"/>
-          <a:chOff x="0" y="0"/>
-          <a:chExt cx="0" cy="0"/>
-        </a:xfrm>
-      </p:grpSpPr>
-      <p:sp>
-        <p:nvSpPr>
-          <p:cNvPr id="2" name="Title 1"/>
-          <p:cNvSpPr>
-            <a:spLocks noGrp="1"/>
-          </p:cNvSpPr>
-          <p:nvPr>
-            <p:ph type="title"/>
-          </p:nvPr>
-        </p:nvSpPr>
-        <p:spPr/>
-        <p:txBody>
-          <a:bodyPr/>
-          <a:lstStyle/>
-          <a:p>
-            <a:r>
-              <a:rPr lang="en-GB" dirty="0"/>
-              <a:t>Dependency inversion principle</a:t>
-            </a:r>
-          </a:p>
-        </p:txBody>
-      </p:sp>
-      <p:sp>
-        <p:nvSpPr>
-          <p:cNvPr id="3" name="Content Placeholder 2"/>
-          <p:cNvSpPr>
-            <a:spLocks noGrp="1"/>
-          </p:cNvSpPr>
-          <p:nvPr>
-            <p:ph idx="1"/>
-          </p:nvPr>
-        </p:nvSpPr>
-        <p:spPr/>
-        <p:txBody>
-          <a:bodyPr/>
-          <a:lstStyle/>
-          <a:p>
-            <a:endParaRPr lang="en-GB"/>
-          </a:p>
-        </p:txBody>
-      </p:sp>
-    </p:spTree>
-    <p:extLst>
-      <p:ext uri="{BB962C8B-B14F-4D97-AF65-F5344CB8AC3E}">
-        <p14:creationId xmlns:p14="http://schemas.microsoft.com/office/powerpoint/2010/main" val="2244263853"/>
       </p:ext>
     </p:extLst>
   </p:cSld>

</xml_diff>